<commit_message>
Add slides and sample code for the Facade design pattern
</commit_message>
<xml_diff>
--- a/training/Design_Patterns/doc/Design Patterns, Prototype.pptx
+++ b/training/Design_Patterns/doc/Design Patterns, Prototype.pptx
@@ -355,7 +355,7 @@
           <a:p>
             <a:fld id="{ED291B17-9318-49DB-B28B-6E5994AE9581}" type="datetime1">
               <a:rPr lang="en-US" smtClean="0"/>
-              <a:t>5/9/2022</a:t>
+              <a:t>5/10/2022</a:t>
             </a:fld>
             <a:endParaRPr lang="en-US" dirty="0"/>
           </a:p>
@@ -558,7 +558,7 @@
           <a:p>
             <a:fld id="{2CED4963-E985-44C4-B8C4-FDD613B7C2F8}" type="datetime1">
               <a:rPr lang="en-US" smtClean="0"/>
-              <a:t>5/9/2022</a:t>
+              <a:t>5/10/2022</a:t>
             </a:fld>
             <a:endParaRPr lang="en-US" dirty="0"/>
           </a:p>
@@ -920,7 +920,7 @@
           <a:p>
             <a:fld id="{ED291B17-9318-49DB-B28B-6E5994AE9581}" type="datetime1">
               <a:rPr lang="en-US" smtClean="0"/>
-              <a:t>5/9/2022</a:t>
+              <a:t>5/10/2022</a:t>
             </a:fld>
             <a:endParaRPr lang="en-US" dirty="0"/>
           </a:p>
@@ -1118,7 +1118,7 @@
           <a:p>
             <a:fld id="{78DD82B9-B8EE-4375-B6FF-88FA6ABB15D9}" type="datetime1">
               <a:rPr lang="en-US" smtClean="0"/>
-              <a:t>5/9/2022</a:t>
+              <a:t>5/10/2022</a:t>
             </a:fld>
             <a:endParaRPr lang="en-US" dirty="0"/>
           </a:p>
@@ -1430,7 +1430,7 @@
           <a:p>
             <a:fld id="{B2497495-0637-405E-AE64-5CC7506D51F5}" type="datetime1">
               <a:rPr lang="en-US" smtClean="0"/>
-              <a:t>5/9/2022</a:t>
+              <a:t>5/10/2022</a:t>
             </a:fld>
             <a:endParaRPr lang="en-US" dirty="0"/>
           </a:p>
@@ -1683,7 +1683,7 @@
           <a:p>
             <a:fld id="{7BFFD690-9426-415D-8B65-26881E07B2D4}" type="datetime1">
               <a:rPr lang="en-US" smtClean="0"/>
-              <a:t>5/9/2022</a:t>
+              <a:t>5/10/2022</a:t>
             </a:fld>
             <a:endParaRPr lang="en-US" dirty="0"/>
           </a:p>
@@ -2105,7 +2105,7 @@
           <a:p>
             <a:fld id="{04C4989A-474C-40DE-95B9-011C28B71673}" type="datetime1">
               <a:rPr lang="en-US" smtClean="0"/>
-              <a:t>5/9/2022</a:t>
+              <a:t>5/10/2022</a:t>
             </a:fld>
             <a:endParaRPr lang="en-US" dirty="0"/>
           </a:p>
@@ -2228,7 +2228,7 @@
           <a:p>
             <a:fld id="{5DB4ED54-5B5E-4A04-93D3-5772E3CE3818}" type="datetime1">
               <a:rPr lang="en-US" smtClean="0"/>
-              <a:t>5/9/2022</a:t>
+              <a:t>5/10/2022</a:t>
             </a:fld>
             <a:endParaRPr lang="en-US" dirty="0"/>
           </a:p>
@@ -2323,7 +2323,7 @@
           <a:p>
             <a:fld id="{4EDE50D6-574B-40AF-946F-D52A04ADE379}" type="datetime1">
               <a:rPr lang="en-US" smtClean="0"/>
-              <a:t>5/9/2022</a:t>
+              <a:t>5/10/2022</a:t>
             </a:fld>
             <a:endParaRPr lang="en-US" dirty="0"/>
           </a:p>
@@ -2700,7 +2700,7 @@
           <a:p>
             <a:fld id="{D82884F1-FFEA-405F-9602-3DCA865EDA4E}" type="datetime1">
               <a:rPr lang="en-US" smtClean="0"/>
-              <a:t>5/9/2022</a:t>
+              <a:t>5/10/2022</a:t>
             </a:fld>
             <a:endParaRPr lang="en-US" dirty="0"/>
           </a:p>
@@ -2993,7 +2993,7 @@
           <a:p>
             <a:fld id="{7E18DB4A-8810-4A10-AD5C-D5E2C667F5B3}" type="datetime1">
               <a:rPr lang="en-US" smtClean="0"/>
-              <a:t>5/9/2022</a:t>
+              <a:t>5/10/2022</a:t>
             </a:fld>
             <a:endParaRPr lang="en-US" dirty="0"/>
           </a:p>
@@ -3208,7 +3208,7 @@
           <a:p>
             <a:fld id="{ED291B17-9318-49DB-B28B-6E5994AE9581}" type="datetime1">
               <a:rPr lang="en-US" smtClean="0"/>
-              <a:t>5/9/2022</a:t>
+              <a:t>5/10/2022</a:t>
             </a:fld>
             <a:endParaRPr lang="en-US" dirty="0"/>
           </a:p>
@@ -4839,6 +4839,15 @@
             <a:endParaRPr lang="en-US" dirty="0"/>
           </a:p>
           <a:p>
+            <a:r>
+              <a:rPr lang="en-US">
+                <a:hlinkClick r:id="rId5"/>
+              </a:rPr>
+              <a:t>https://www.baeldung.com/java-deep-copy</a:t>
+            </a:r>
+            <a:endParaRPr lang="en-US" dirty="0"/>
+          </a:p>
+          <a:p>
             <a:endParaRPr lang="en-US" dirty="0"/>
           </a:p>
         </p:txBody>

</xml_diff>